<commit_message>
AV224 updated lecture 24
</commit_message>
<xml_diff>
--- a/2017_AV224/Material/Lecture_24.pptx
+++ b/2017_AV224/Material/Lecture_24.pptx
@@ -16,7 +16,12 @@
     <p:sldId id="409" r:id="rId9"/>
     <p:sldId id="410" r:id="rId10"/>
     <p:sldId id="411" r:id="rId11"/>
-    <p:sldId id="412" r:id="rId12"/>
+    <p:sldId id="413" r:id="rId12"/>
+    <p:sldId id="412" r:id="rId13"/>
+    <p:sldId id="414" r:id="rId14"/>
+    <p:sldId id="416" r:id="rId15"/>
+    <p:sldId id="417" r:id="rId16"/>
+    <p:sldId id="418" r:id="rId17"/>
   </p:sldIdLst>
   <p:sldSz cx="12192000" cy="6858000"/>
   <p:notesSz cx="6858000" cy="9144000"/>
@@ -530,6 +535,266 @@
 </p:notes>
 </file>
 
+<file path=ppt/notesSlides/notesSlide10.xml><?xml version="1.0" encoding="utf-8"?>
+<p:notes xmlns:a="http://schemas.openxmlformats.org/drawingml/2006/main" xmlns:r="http://schemas.openxmlformats.org/officeDocument/2006/relationships" xmlns:p="http://schemas.openxmlformats.org/presentationml/2006/main">
+  <p:cSld>
+    <p:spTree>
+      <p:nvGrpSpPr>
+        <p:cNvPr id="1" name=""/>
+        <p:cNvGrpSpPr/>
+        <p:nvPr/>
+      </p:nvGrpSpPr>
+      <p:grpSpPr/>
+      <p:sp>
+        <p:nvSpPr>
+          <p:cNvPr id="2" name="Slide Image Placeholder 1"/>
+          <p:cNvSpPr/>
+          <p:nvPr>
+            <p:ph type="sldImg" idx="2"/>
+          </p:nvPr>
+        </p:nvSpPr>
+        <p:spPr/>
+      </p:sp>
+      <p:sp>
+        <p:nvSpPr>
+          <p:cNvPr id="3" name="Text Placeholder 2"/>
+          <p:cNvSpPr/>
+          <p:nvPr>
+            <p:ph type="body" idx="3"/>
+          </p:nvPr>
+        </p:nvSpPr>
+        <p:spPr/>
+        <p:txBody>
+          <a:bodyPr/>
+          <a:p>
+            <a:endParaRPr lang="x-none" altLang="en-IN"/>
+          </a:p>
+        </p:txBody>
+      </p:sp>
+      <p:sp>
+        <p:nvSpPr>
+          <p:cNvPr id="4" name="Slide Number Placeholder 3"/>
+          <p:cNvSpPr>
+            <a:spLocks noGrp="1"/>
+          </p:cNvSpPr>
+          <p:nvPr>
+            <p:ph type="sldNum" sz="quarter" idx="5"/>
+          </p:nvPr>
+        </p:nvSpPr>
+        <p:spPr/>
+        <p:txBody>
+          <a:bodyPr/>
+          <a:p>
+            <a:fld id="{21B2AA4F-B828-4D7C-AFD3-893933DAFCB4}" type="slidenum">
+              <a:rPr lang="en-US" smtClean="0"/>
+            </a:fld>
+            <a:endParaRPr lang="en-US"/>
+          </a:p>
+        </p:txBody>
+      </p:sp>
+    </p:spTree>
+  </p:cSld>
+  <p:clrMapOvr>
+    <a:masterClrMapping/>
+  </p:clrMapOvr>
+</p:notes>
+</file>
+
+<file path=ppt/notesSlides/notesSlide11.xml><?xml version="1.0" encoding="utf-8"?>
+<p:notes xmlns:a="http://schemas.openxmlformats.org/drawingml/2006/main" xmlns:r="http://schemas.openxmlformats.org/officeDocument/2006/relationships" xmlns:p="http://schemas.openxmlformats.org/presentationml/2006/main">
+  <p:cSld>
+    <p:spTree>
+      <p:nvGrpSpPr>
+        <p:cNvPr id="1" name=""/>
+        <p:cNvGrpSpPr/>
+        <p:nvPr/>
+      </p:nvGrpSpPr>
+      <p:grpSpPr/>
+      <p:sp>
+        <p:nvSpPr>
+          <p:cNvPr id="2" name="Slide Image Placeholder 1"/>
+          <p:cNvSpPr/>
+          <p:nvPr>
+            <p:ph type="sldImg" idx="2"/>
+          </p:nvPr>
+        </p:nvSpPr>
+        <p:spPr/>
+      </p:sp>
+      <p:sp>
+        <p:nvSpPr>
+          <p:cNvPr id="3" name="Text Placeholder 2"/>
+          <p:cNvSpPr/>
+          <p:nvPr>
+            <p:ph type="body" idx="3"/>
+          </p:nvPr>
+        </p:nvSpPr>
+        <p:spPr/>
+        <p:txBody>
+          <a:bodyPr/>
+          <a:p>
+            <a:endParaRPr lang="x-none" altLang="en-IN"/>
+          </a:p>
+        </p:txBody>
+      </p:sp>
+      <p:sp>
+        <p:nvSpPr>
+          <p:cNvPr id="4" name="Slide Number Placeholder 3"/>
+          <p:cNvSpPr>
+            <a:spLocks noGrp="1"/>
+          </p:cNvSpPr>
+          <p:nvPr>
+            <p:ph type="sldNum" sz="quarter" idx="5"/>
+          </p:nvPr>
+        </p:nvSpPr>
+        <p:spPr/>
+        <p:txBody>
+          <a:bodyPr/>
+          <a:p>
+            <a:fld id="{21B2AA4F-B828-4D7C-AFD3-893933DAFCB4}" type="slidenum">
+              <a:rPr lang="en-US" smtClean="0"/>
+            </a:fld>
+            <a:endParaRPr lang="en-US"/>
+          </a:p>
+        </p:txBody>
+      </p:sp>
+    </p:spTree>
+  </p:cSld>
+  <p:clrMapOvr>
+    <a:masterClrMapping/>
+  </p:clrMapOvr>
+</p:notes>
+</file>
+
+<file path=ppt/notesSlides/notesSlide12.xml><?xml version="1.0" encoding="utf-8"?>
+<p:notes xmlns:a="http://schemas.openxmlformats.org/drawingml/2006/main" xmlns:r="http://schemas.openxmlformats.org/officeDocument/2006/relationships" xmlns:p="http://schemas.openxmlformats.org/presentationml/2006/main">
+  <p:cSld>
+    <p:spTree>
+      <p:nvGrpSpPr>
+        <p:cNvPr id="1" name=""/>
+        <p:cNvGrpSpPr/>
+        <p:nvPr/>
+      </p:nvGrpSpPr>
+      <p:grpSpPr/>
+      <p:sp>
+        <p:nvSpPr>
+          <p:cNvPr id="2" name="Slide Image Placeholder 1"/>
+          <p:cNvSpPr/>
+          <p:nvPr>
+            <p:ph type="sldImg" idx="2"/>
+          </p:nvPr>
+        </p:nvSpPr>
+        <p:spPr/>
+      </p:sp>
+      <p:sp>
+        <p:nvSpPr>
+          <p:cNvPr id="3" name="Text Placeholder 2"/>
+          <p:cNvSpPr/>
+          <p:nvPr>
+            <p:ph type="body" idx="3"/>
+          </p:nvPr>
+        </p:nvSpPr>
+        <p:spPr/>
+        <p:txBody>
+          <a:bodyPr/>
+          <a:p>
+            <a:endParaRPr lang="x-none" altLang="en-IN"/>
+          </a:p>
+        </p:txBody>
+      </p:sp>
+      <p:sp>
+        <p:nvSpPr>
+          <p:cNvPr id="4" name="Slide Number Placeholder 3"/>
+          <p:cNvSpPr>
+            <a:spLocks noGrp="1"/>
+          </p:cNvSpPr>
+          <p:nvPr>
+            <p:ph type="sldNum" sz="quarter" idx="5"/>
+          </p:nvPr>
+        </p:nvSpPr>
+        <p:spPr/>
+        <p:txBody>
+          <a:bodyPr/>
+          <a:p>
+            <a:fld id="{21B2AA4F-B828-4D7C-AFD3-893933DAFCB4}" type="slidenum">
+              <a:rPr lang="en-US" smtClean="0"/>
+            </a:fld>
+            <a:endParaRPr lang="en-US"/>
+          </a:p>
+        </p:txBody>
+      </p:sp>
+    </p:spTree>
+  </p:cSld>
+  <p:clrMapOvr>
+    <a:masterClrMapping/>
+  </p:clrMapOvr>
+</p:notes>
+</file>
+
+<file path=ppt/notesSlides/notesSlide13.xml><?xml version="1.0" encoding="utf-8"?>
+<p:notes xmlns:a="http://schemas.openxmlformats.org/drawingml/2006/main" xmlns:r="http://schemas.openxmlformats.org/officeDocument/2006/relationships" xmlns:p="http://schemas.openxmlformats.org/presentationml/2006/main">
+  <p:cSld>
+    <p:spTree>
+      <p:nvGrpSpPr>
+        <p:cNvPr id="1" name=""/>
+        <p:cNvGrpSpPr/>
+        <p:nvPr/>
+      </p:nvGrpSpPr>
+      <p:grpSpPr/>
+      <p:sp>
+        <p:nvSpPr>
+          <p:cNvPr id="2" name="Slide Image Placeholder 1"/>
+          <p:cNvSpPr/>
+          <p:nvPr>
+            <p:ph type="sldImg" idx="2"/>
+          </p:nvPr>
+        </p:nvSpPr>
+        <p:spPr/>
+      </p:sp>
+      <p:sp>
+        <p:nvSpPr>
+          <p:cNvPr id="3" name="Text Placeholder 2"/>
+          <p:cNvSpPr/>
+          <p:nvPr>
+            <p:ph type="body" idx="3"/>
+          </p:nvPr>
+        </p:nvSpPr>
+        <p:spPr/>
+        <p:txBody>
+          <a:bodyPr/>
+          <a:p>
+            <a:endParaRPr lang="x-none" altLang="en-IN"/>
+          </a:p>
+        </p:txBody>
+      </p:sp>
+      <p:sp>
+        <p:nvSpPr>
+          <p:cNvPr id="4" name="Slide Number Placeholder 3"/>
+          <p:cNvSpPr>
+            <a:spLocks noGrp="1"/>
+          </p:cNvSpPr>
+          <p:nvPr>
+            <p:ph type="sldNum" sz="quarter" idx="5"/>
+          </p:nvPr>
+        </p:nvSpPr>
+        <p:spPr/>
+        <p:txBody>
+          <a:bodyPr/>
+          <a:p>
+            <a:fld id="{21B2AA4F-B828-4D7C-AFD3-893933DAFCB4}" type="slidenum">
+              <a:rPr lang="en-US" smtClean="0"/>
+            </a:fld>
+            <a:endParaRPr lang="en-US"/>
+          </a:p>
+        </p:txBody>
+      </p:sp>
+    </p:spTree>
+  </p:cSld>
+  <p:clrMapOvr>
+    <a:masterClrMapping/>
+  </p:clrMapOvr>
+</p:notes>
+</file>
+
 <file path=ppt/notesSlides/notesSlide2.xml><?xml version="1.0" encoding="utf-8"?>
 <p:notes xmlns:a="http://schemas.openxmlformats.org/drawingml/2006/main" xmlns:r="http://schemas.openxmlformats.org/officeDocument/2006/relationships" xmlns:p="http://schemas.openxmlformats.org/presentationml/2006/main">
   <p:cSld>
@@ -921,6 +1186,71 @@
 </file>
 
 <file path=ppt/notesSlides/notesSlide8.xml><?xml version="1.0" encoding="utf-8"?>
+<p:notes xmlns:a="http://schemas.openxmlformats.org/drawingml/2006/main" xmlns:r="http://schemas.openxmlformats.org/officeDocument/2006/relationships" xmlns:p="http://schemas.openxmlformats.org/presentationml/2006/main">
+  <p:cSld>
+    <p:spTree>
+      <p:nvGrpSpPr>
+        <p:cNvPr id="1" name=""/>
+        <p:cNvGrpSpPr/>
+        <p:nvPr/>
+      </p:nvGrpSpPr>
+      <p:grpSpPr/>
+      <p:sp>
+        <p:nvSpPr>
+          <p:cNvPr id="2" name="Slide Image Placeholder 1"/>
+          <p:cNvSpPr/>
+          <p:nvPr>
+            <p:ph type="sldImg" idx="2"/>
+          </p:nvPr>
+        </p:nvSpPr>
+        <p:spPr/>
+      </p:sp>
+      <p:sp>
+        <p:nvSpPr>
+          <p:cNvPr id="3" name="Text Placeholder 2"/>
+          <p:cNvSpPr/>
+          <p:nvPr>
+            <p:ph type="body" idx="3"/>
+          </p:nvPr>
+        </p:nvSpPr>
+        <p:spPr/>
+        <p:txBody>
+          <a:bodyPr/>
+          <a:p>
+            <a:endParaRPr lang="x-none" altLang="en-IN"/>
+          </a:p>
+        </p:txBody>
+      </p:sp>
+      <p:sp>
+        <p:nvSpPr>
+          <p:cNvPr id="4" name="Slide Number Placeholder 3"/>
+          <p:cNvSpPr>
+            <a:spLocks noGrp="1"/>
+          </p:cNvSpPr>
+          <p:nvPr>
+            <p:ph type="sldNum" sz="quarter" idx="5"/>
+          </p:nvPr>
+        </p:nvSpPr>
+        <p:spPr/>
+        <p:txBody>
+          <a:bodyPr/>
+          <a:p>
+            <a:fld id="{21B2AA4F-B828-4D7C-AFD3-893933DAFCB4}" type="slidenum">
+              <a:rPr lang="en-US" smtClean="0"/>
+            </a:fld>
+            <a:endParaRPr lang="en-US"/>
+          </a:p>
+        </p:txBody>
+      </p:sp>
+    </p:spTree>
+  </p:cSld>
+  <p:clrMapOvr>
+    <a:masterClrMapping/>
+  </p:clrMapOvr>
+</p:notes>
+</file>
+
+<file path=ppt/notesSlides/notesSlide9.xml><?xml version="1.0" encoding="utf-8"?>
 <p:notes xmlns:a="http://schemas.openxmlformats.org/drawingml/2006/main" xmlns:r="http://schemas.openxmlformats.org/officeDocument/2006/relationships" xmlns:p="http://schemas.openxmlformats.org/presentationml/2006/main">
   <p:cSld>
     <p:spTree>
@@ -4283,6 +4613,1527 @@
 </p:sld>
 </file>
 
+<file path=ppt/slides/slide10.xml><?xml version="1.0" encoding="utf-8"?>
+<p:sld xmlns:a="http://schemas.openxmlformats.org/drawingml/2006/main" xmlns:r="http://schemas.openxmlformats.org/officeDocument/2006/relationships" xmlns:p="http://schemas.openxmlformats.org/presentationml/2006/main">
+  <p:cSld>
+    <p:spTree>
+      <p:nvGrpSpPr>
+        <p:cNvPr id="1" name=""/>
+        <p:cNvGrpSpPr/>
+        <p:nvPr/>
+      </p:nvGrpSpPr>
+      <p:grpSpPr/>
+      <p:sp>
+        <p:nvSpPr>
+          <p:cNvPr id="4" name="Rectangle 3"/>
+          <p:cNvSpPr/>
+          <p:nvPr/>
+        </p:nvSpPr>
+        <p:spPr>
+          <a:xfrm>
+            <a:off x="-3175" y="-11430"/>
+            <a:ext cx="12186920" cy="102235"/>
+          </a:xfrm>
+          <a:prstGeom prst="rect">
+            <a:avLst/>
+          </a:prstGeom>
+        </p:spPr>
+        <p:style>
+          <a:lnRef idx="1">
+            <a:schemeClr val="accent1"/>
+          </a:lnRef>
+          <a:fillRef idx="2">
+            <a:schemeClr val="accent1"/>
+          </a:fillRef>
+          <a:effectRef idx="1">
+            <a:schemeClr val="accent1"/>
+          </a:effectRef>
+          <a:fontRef idx="minor">
+            <a:schemeClr val="dk1"/>
+          </a:fontRef>
+        </p:style>
+        <p:txBody>
+          <a:bodyPr rtlCol="0" anchor="ctr"/>
+          <a:p>
+            <a:pPr algn="ctr"/>
+            <a:endParaRPr lang="en-IN" altLang="en-US"/>
+          </a:p>
+        </p:txBody>
+      </p:sp>
+      <p:sp>
+        <p:nvSpPr>
+          <p:cNvPr id="5" name="Rectangle 4"/>
+          <p:cNvSpPr/>
+          <p:nvPr/>
+        </p:nvSpPr>
+        <p:spPr>
+          <a:xfrm>
+            <a:off x="-4445" y="6741160"/>
+            <a:ext cx="12186920" cy="102235"/>
+          </a:xfrm>
+          <a:prstGeom prst="rect">
+            <a:avLst/>
+          </a:prstGeom>
+        </p:spPr>
+        <p:style>
+          <a:lnRef idx="1">
+            <a:schemeClr val="accent1"/>
+          </a:lnRef>
+          <a:fillRef idx="2">
+            <a:schemeClr val="accent1"/>
+          </a:fillRef>
+          <a:effectRef idx="1">
+            <a:schemeClr val="accent1"/>
+          </a:effectRef>
+          <a:fontRef idx="minor">
+            <a:schemeClr val="dk1"/>
+          </a:fontRef>
+        </p:style>
+        <p:txBody>
+          <a:bodyPr rtlCol="0" anchor="ctr"/>
+          <a:p>
+            <a:pPr algn="ctr"/>
+            <a:endParaRPr lang="en-IN" altLang="en-US"/>
+          </a:p>
+        </p:txBody>
+      </p:sp>
+      <p:pic>
+        <p:nvPicPr>
+          <p:cNvPr id="6" name="Picture 5" descr="images"/>
+          <p:cNvPicPr>
+            <a:picLocks noChangeAspect="1"/>
+          </p:cNvPicPr>
+          <p:nvPr/>
+        </p:nvPicPr>
+        <p:blipFill>
+          <a:blip r:embed="rId1"/>
+          <a:stretch>
+            <a:fillRect/>
+          </a:stretch>
+        </p:blipFill>
+        <p:spPr>
+          <a:xfrm>
+            <a:off x="11468100" y="106680"/>
+            <a:ext cx="715645" cy="626110"/>
+          </a:xfrm>
+          <a:prstGeom prst="rect">
+            <a:avLst/>
+          </a:prstGeom>
+        </p:spPr>
+      </p:pic>
+      <p:sp>
+        <p:nvSpPr>
+          <p:cNvPr id="3" name="TextBox 2"/>
+          <p:cNvSpPr txBox="1"/>
+          <p:nvPr/>
+        </p:nvSpPr>
+        <p:spPr>
+          <a:xfrm>
+            <a:off x="114300" y="223520"/>
+            <a:ext cx="11232515" cy="383540"/>
+          </a:xfrm>
+          <a:prstGeom prst="rect">
+            <a:avLst/>
+          </a:prstGeom>
+          <a:noFill/>
+        </p:spPr>
+        <p:txBody>
+          <a:bodyPr wrap="square" rtlCol="0">
+            <a:spAutoFit/>
+          </a:bodyPr>
+          <a:p>
+            <a:r>
+              <a:rPr lang="x-none" altLang="en-IN">
+                <a:solidFill>
+                  <a:schemeClr val="tx1"/>
+                </a:solidFill>
+              </a:rPr>
+              <a:t>Virtual memory - dirty pages</a:t>
+            </a:r>
+            <a:endParaRPr lang="x-none" altLang="en-IN">
+              <a:solidFill>
+                <a:schemeClr val="tx1"/>
+              </a:solidFill>
+            </a:endParaRPr>
+          </a:p>
+        </p:txBody>
+      </p:sp>
+      <p:sp>
+        <p:nvSpPr>
+          <p:cNvPr id="2" name="TextBox 1"/>
+          <p:cNvSpPr txBox="1"/>
+          <p:nvPr/>
+        </p:nvSpPr>
+        <p:spPr>
+          <a:xfrm>
+            <a:off x="262255" y="647700"/>
+            <a:ext cx="11579860" cy="2029460"/>
+          </a:xfrm>
+          <a:prstGeom prst="rect">
+            <a:avLst/>
+          </a:prstGeom>
+          <a:noFill/>
+        </p:spPr>
+        <p:txBody>
+          <a:bodyPr wrap="square" rtlCol="0">
+            <a:spAutoFit/>
+          </a:bodyPr>
+          <a:p>
+            <a:pPr marL="285750" lvl="0" indent="-285750" algn="just">
+              <a:buFont typeface="Arial" charset="0"/>
+              <a:buChar char="•"/>
+            </a:pPr>
+            <a:r>
+              <a:rPr lang="x-none" altLang="en-IN"/>
+              <a:t>Suppose there is a page in main memory and one of the words in that page was written to</a:t>
+            </a:r>
+            <a:endParaRPr lang="x-none" altLang="en-IN"/>
+          </a:p>
+          <a:p>
+            <a:pPr marL="285750" lvl="0" indent="-285750" algn="just">
+              <a:buFont typeface="Arial" charset="0"/>
+              <a:buChar char="•"/>
+            </a:pPr>
+            <a:r>
+              <a:rPr lang="x-none" altLang="en-IN"/>
+              <a:t>Write through is not efficient, as we don't want to write to the disk everytime to maintain consistency (disk access is of the order of millions of processor cycle times)</a:t>
+            </a:r>
+            <a:endParaRPr lang="x-none" altLang="en-IN"/>
+          </a:p>
+          <a:p>
+            <a:pPr marL="285750" lvl="0" indent="-285750" algn="just">
+              <a:buFont typeface="Arial" charset="0"/>
+              <a:buChar char="•"/>
+            </a:pPr>
+            <a:r>
+              <a:rPr lang="x-none" altLang="en-IN"/>
+              <a:t>Write back is used</a:t>
+            </a:r>
+            <a:endParaRPr lang="x-none" altLang="en-IN"/>
+          </a:p>
+          <a:p>
+            <a:pPr marL="285750" lvl="0" indent="-285750" algn="just">
+              <a:buFont typeface="Arial" charset="0"/>
+              <a:buChar char="•"/>
+            </a:pPr>
+            <a:r>
+              <a:rPr lang="x-none" altLang="en-IN"/>
+              <a:t>The page table also consists of a dirty bit.</a:t>
+            </a:r>
+            <a:endParaRPr lang="x-none" altLang="en-IN"/>
+          </a:p>
+          <a:p>
+            <a:pPr marL="742950" lvl="1" indent="-285750" algn="just">
+              <a:buFont typeface="Arial" charset="0"/>
+              <a:buChar char="•"/>
+            </a:pPr>
+            <a:r>
+              <a:rPr lang="x-none" altLang="en-IN"/>
+              <a:t>The bit is set whenever any word on a page is modified</a:t>
+            </a:r>
+            <a:endParaRPr lang="x-none" altLang="en-IN"/>
+          </a:p>
+          <a:p>
+            <a:pPr marL="742950" lvl="1" indent="-285750" algn="just">
+              <a:buFont typeface="Arial" charset="0"/>
+              <a:buChar char="•"/>
+            </a:pPr>
+            <a:r>
+              <a:rPr lang="x-none" altLang="en-IN"/>
+              <a:t>If the dirty bit is set for a page which has to be replaced, then it needs to be written back to the disk</a:t>
+            </a:r>
+            <a:endParaRPr lang="x-none" altLang="en-IN"/>
+          </a:p>
+        </p:txBody>
+      </p:sp>
+      <p:pic>
+        <p:nvPicPr>
+          <p:cNvPr id="148482" name="Picture 5" descr="f05-23-P374493"/>
+          <p:cNvPicPr>
+            <a:picLocks noChangeAspect="1"/>
+          </p:cNvPicPr>
+          <p:nvPr/>
+        </p:nvPicPr>
+        <p:blipFill>
+          <a:blip r:embed="rId2"/>
+          <a:srcRect l="9055" t="40221" r="50986"/>
+          <a:stretch>
+            <a:fillRect/>
+          </a:stretch>
+        </p:blipFill>
+        <p:spPr>
+          <a:xfrm>
+            <a:off x="4269105" y="3032760"/>
+            <a:ext cx="3010535" cy="3174365"/>
+          </a:xfrm>
+          <a:prstGeom prst="rect">
+            <a:avLst/>
+          </a:prstGeom>
+          <a:noFill/>
+          <a:ln w="9525">
+            <a:noFill/>
+            <a:miter/>
+          </a:ln>
+        </p:spPr>
+      </p:pic>
+    </p:spTree>
+  </p:cSld>
+  <p:clrMapOvr>
+    <a:masterClrMapping/>
+  </p:clrMapOvr>
+  <p:timing>
+    <p:tnLst>
+      <p:par>
+        <p:cTn id="1" dur="indefinite" restart="never" nodeType="tmRoot"/>
+      </p:par>
+    </p:tnLst>
+  </p:timing>
+</p:sld>
+</file>
+
+<file path=ppt/slides/slide11.xml><?xml version="1.0" encoding="utf-8"?>
+<p:sld xmlns:a="http://schemas.openxmlformats.org/drawingml/2006/main" xmlns:r="http://schemas.openxmlformats.org/officeDocument/2006/relationships" xmlns:p="http://schemas.openxmlformats.org/presentationml/2006/main">
+  <p:cSld>
+    <p:spTree>
+      <p:nvGrpSpPr>
+        <p:cNvPr id="1" name=""/>
+        <p:cNvGrpSpPr/>
+        <p:nvPr/>
+      </p:nvGrpSpPr>
+      <p:grpSpPr/>
+      <p:sp>
+        <p:nvSpPr>
+          <p:cNvPr id="4" name="Rectangle 3"/>
+          <p:cNvSpPr/>
+          <p:nvPr/>
+        </p:nvSpPr>
+        <p:spPr>
+          <a:xfrm>
+            <a:off x="-3175" y="-11430"/>
+            <a:ext cx="12186920" cy="102235"/>
+          </a:xfrm>
+          <a:prstGeom prst="rect">
+            <a:avLst/>
+          </a:prstGeom>
+        </p:spPr>
+        <p:style>
+          <a:lnRef idx="1">
+            <a:schemeClr val="accent1"/>
+          </a:lnRef>
+          <a:fillRef idx="2">
+            <a:schemeClr val="accent1"/>
+          </a:fillRef>
+          <a:effectRef idx="1">
+            <a:schemeClr val="accent1"/>
+          </a:effectRef>
+          <a:fontRef idx="minor">
+            <a:schemeClr val="dk1"/>
+          </a:fontRef>
+        </p:style>
+        <p:txBody>
+          <a:bodyPr rtlCol="0" anchor="ctr"/>
+          <a:p>
+            <a:pPr algn="ctr"/>
+            <a:endParaRPr lang="en-IN" altLang="en-US"/>
+          </a:p>
+        </p:txBody>
+      </p:sp>
+      <p:sp>
+        <p:nvSpPr>
+          <p:cNvPr id="5" name="Rectangle 4"/>
+          <p:cNvSpPr/>
+          <p:nvPr/>
+        </p:nvSpPr>
+        <p:spPr>
+          <a:xfrm>
+            <a:off x="-4445" y="6741160"/>
+            <a:ext cx="12186920" cy="102235"/>
+          </a:xfrm>
+          <a:prstGeom prst="rect">
+            <a:avLst/>
+          </a:prstGeom>
+        </p:spPr>
+        <p:style>
+          <a:lnRef idx="1">
+            <a:schemeClr val="accent1"/>
+          </a:lnRef>
+          <a:fillRef idx="2">
+            <a:schemeClr val="accent1"/>
+          </a:fillRef>
+          <a:effectRef idx="1">
+            <a:schemeClr val="accent1"/>
+          </a:effectRef>
+          <a:fontRef idx="minor">
+            <a:schemeClr val="dk1"/>
+          </a:fontRef>
+        </p:style>
+        <p:txBody>
+          <a:bodyPr rtlCol="0" anchor="ctr"/>
+          <a:p>
+            <a:pPr algn="ctr"/>
+            <a:endParaRPr lang="en-IN" altLang="en-US"/>
+          </a:p>
+        </p:txBody>
+      </p:sp>
+      <p:pic>
+        <p:nvPicPr>
+          <p:cNvPr id="6" name="Picture 5" descr="images"/>
+          <p:cNvPicPr>
+            <a:picLocks noChangeAspect="1"/>
+          </p:cNvPicPr>
+          <p:nvPr/>
+        </p:nvPicPr>
+        <p:blipFill>
+          <a:blip r:embed="rId1"/>
+          <a:stretch>
+            <a:fillRect/>
+          </a:stretch>
+        </p:blipFill>
+        <p:spPr>
+          <a:xfrm>
+            <a:off x="11468100" y="106680"/>
+            <a:ext cx="715645" cy="626110"/>
+          </a:xfrm>
+          <a:prstGeom prst="rect">
+            <a:avLst/>
+          </a:prstGeom>
+        </p:spPr>
+      </p:pic>
+      <p:sp>
+        <p:nvSpPr>
+          <p:cNvPr id="3" name="TextBox 2"/>
+          <p:cNvSpPr txBox="1"/>
+          <p:nvPr/>
+        </p:nvSpPr>
+        <p:spPr>
+          <a:xfrm>
+            <a:off x="114300" y="223520"/>
+            <a:ext cx="11232515" cy="383540"/>
+          </a:xfrm>
+          <a:prstGeom prst="rect">
+            <a:avLst/>
+          </a:prstGeom>
+          <a:noFill/>
+        </p:spPr>
+        <p:txBody>
+          <a:bodyPr wrap="square" rtlCol="0">
+            <a:spAutoFit/>
+          </a:bodyPr>
+          <a:p>
+            <a:r>
+              <a:rPr lang="x-none" altLang="en-IN">
+                <a:solidFill>
+                  <a:schemeClr val="tx1"/>
+                </a:solidFill>
+              </a:rPr>
+              <a:t>Virtual memory - Translation Lookaside Buffers (TLBs)</a:t>
+            </a:r>
+            <a:endParaRPr lang="x-none" altLang="en-IN">
+              <a:solidFill>
+                <a:schemeClr val="tx1"/>
+              </a:solidFill>
+            </a:endParaRPr>
+          </a:p>
+        </p:txBody>
+      </p:sp>
+      <p:sp>
+        <p:nvSpPr>
+          <p:cNvPr id="2" name="TextBox 1"/>
+          <p:cNvSpPr txBox="1"/>
+          <p:nvPr/>
+        </p:nvSpPr>
+        <p:spPr>
+          <a:xfrm>
+            <a:off x="262255" y="648335"/>
+            <a:ext cx="4683760" cy="3949700"/>
+          </a:xfrm>
+          <a:prstGeom prst="rect">
+            <a:avLst/>
+          </a:prstGeom>
+          <a:noFill/>
+        </p:spPr>
+        <p:txBody>
+          <a:bodyPr wrap="square" rtlCol="0">
+            <a:spAutoFit/>
+          </a:bodyPr>
+          <a:p>
+            <a:pPr marL="285750" lvl="0" indent="-285750" algn="just">
+              <a:buFont typeface="Arial" charset="0"/>
+              <a:buChar char="•"/>
+            </a:pPr>
+            <a:r>
+              <a:rPr lang="x-none" altLang="en-IN"/>
+              <a:t>Page tables are stored in main memory</a:t>
+            </a:r>
+            <a:endParaRPr lang="x-none" altLang="en-IN"/>
+          </a:p>
+          <a:p>
+            <a:pPr marL="285750" lvl="0" indent="-285750" algn="just">
+              <a:buFont typeface="Arial" charset="0"/>
+              <a:buChar char="•"/>
+            </a:pPr>
+            <a:r>
+              <a:rPr lang="x-none" altLang="en-IN"/>
+              <a:t>Each main memory access actual requires two memory accesses!</a:t>
+            </a:r>
+            <a:endParaRPr lang="x-none" altLang="en-IN"/>
+          </a:p>
+          <a:p>
+            <a:pPr marL="742950" lvl="1" indent="-285750" algn="just">
+              <a:buFont typeface="Arial" charset="0"/>
+              <a:buChar char="•"/>
+            </a:pPr>
+            <a:r>
+              <a:rPr lang="x-none" altLang="en-IN"/>
+              <a:t>One to access page table using the virtual address</a:t>
+            </a:r>
+            <a:endParaRPr lang="x-none" altLang="en-IN"/>
+          </a:p>
+          <a:p>
+            <a:pPr marL="742950" lvl="1" indent="-285750" algn="just">
+              <a:buFont typeface="Arial" charset="0"/>
+              <a:buChar char="•"/>
+            </a:pPr>
+            <a:r>
+              <a:rPr lang="x-none" altLang="en-IN"/>
+              <a:t>And the next to access the actual physical address obtained from the page table</a:t>
+            </a:r>
+            <a:endParaRPr lang="x-none" altLang="en-IN"/>
+          </a:p>
+          <a:p>
+            <a:pPr marL="285750" lvl="0" indent="-285750" algn="just">
+              <a:buFont typeface="Arial" charset="0"/>
+              <a:buChar char="•"/>
+            </a:pPr>
+            <a:r>
+              <a:rPr lang="x-none" altLang="en-IN"/>
+              <a:t>Locality of reference to the page table comes to the rescue</a:t>
+            </a:r>
+            <a:endParaRPr lang="x-none" altLang="en-IN"/>
+          </a:p>
+          <a:p>
+            <a:pPr marL="285750" lvl="0" indent="-285750" algn="just">
+              <a:buFont typeface="Arial" charset="0"/>
+              <a:buChar char="•"/>
+            </a:pPr>
+            <a:r>
+              <a:rPr lang="x-none" altLang="en-IN"/>
+              <a:t>Special cache for recent translations (from virtual to physical addresses)</a:t>
+            </a:r>
+            <a:endParaRPr lang="x-none" altLang="en-IN"/>
+          </a:p>
+          <a:p>
+            <a:pPr marL="742950" lvl="1" indent="-285750" algn="just">
+              <a:buFont typeface="Arial" charset="0"/>
+              <a:buChar char="•"/>
+            </a:pPr>
+            <a:r>
+              <a:rPr lang="x-none" altLang="en-IN">
+                <a:solidFill>
+                  <a:srgbClr val="FF0000"/>
+                </a:solidFill>
+              </a:rPr>
+              <a:t>Translation Lookaside Buffer or Translation Cache</a:t>
+            </a:r>
+            <a:endParaRPr lang="x-none" altLang="en-IN">
+              <a:solidFill>
+                <a:srgbClr val="FF0000"/>
+              </a:solidFill>
+            </a:endParaRPr>
+          </a:p>
+        </p:txBody>
+      </p:sp>
+      <p:pic>
+        <p:nvPicPr>
+          <p:cNvPr id="148482" name="Picture 5" descr="f05-23-P374493"/>
+          <p:cNvPicPr>
+            <a:picLocks noChangeAspect="1"/>
+          </p:cNvPicPr>
+          <p:nvPr/>
+        </p:nvPicPr>
+        <p:blipFill>
+          <a:blip r:embed="rId2"/>
+          <a:stretch>
+            <a:fillRect/>
+          </a:stretch>
+        </p:blipFill>
+        <p:spPr>
+          <a:xfrm>
+            <a:off x="5014595" y="1152843"/>
+            <a:ext cx="6535738" cy="4606925"/>
+          </a:xfrm>
+          <a:prstGeom prst="rect">
+            <a:avLst/>
+          </a:prstGeom>
+          <a:noFill/>
+          <a:ln w="9525">
+            <a:noFill/>
+            <a:miter/>
+          </a:ln>
+        </p:spPr>
+      </p:pic>
+    </p:spTree>
+  </p:cSld>
+  <p:clrMapOvr>
+    <a:masterClrMapping/>
+  </p:clrMapOvr>
+  <p:timing>
+    <p:tnLst>
+      <p:par>
+        <p:cTn id="1" dur="indefinite" restart="never" nodeType="tmRoot"/>
+      </p:par>
+    </p:tnLst>
+  </p:timing>
+</p:sld>
+</file>
+
+<file path=ppt/slides/slide12.xml><?xml version="1.0" encoding="utf-8"?>
+<p:sld xmlns:a="http://schemas.openxmlformats.org/drawingml/2006/main" xmlns:r="http://schemas.openxmlformats.org/officeDocument/2006/relationships" xmlns:p="http://schemas.openxmlformats.org/presentationml/2006/main">
+  <p:cSld>
+    <p:spTree>
+      <p:nvGrpSpPr>
+        <p:cNvPr id="1" name=""/>
+        <p:cNvGrpSpPr/>
+        <p:nvPr/>
+      </p:nvGrpSpPr>
+      <p:grpSpPr/>
+      <p:sp>
+        <p:nvSpPr>
+          <p:cNvPr id="4" name="Rectangle 3"/>
+          <p:cNvSpPr/>
+          <p:nvPr/>
+        </p:nvSpPr>
+        <p:spPr>
+          <a:xfrm>
+            <a:off x="-3175" y="-11430"/>
+            <a:ext cx="12186920" cy="102235"/>
+          </a:xfrm>
+          <a:prstGeom prst="rect">
+            <a:avLst/>
+          </a:prstGeom>
+        </p:spPr>
+        <p:style>
+          <a:lnRef idx="1">
+            <a:schemeClr val="accent1"/>
+          </a:lnRef>
+          <a:fillRef idx="2">
+            <a:schemeClr val="accent1"/>
+          </a:fillRef>
+          <a:effectRef idx="1">
+            <a:schemeClr val="accent1"/>
+          </a:effectRef>
+          <a:fontRef idx="minor">
+            <a:schemeClr val="dk1"/>
+          </a:fontRef>
+        </p:style>
+        <p:txBody>
+          <a:bodyPr rtlCol="0" anchor="ctr"/>
+          <a:p>
+            <a:pPr algn="ctr"/>
+            <a:endParaRPr lang="en-IN" altLang="en-US"/>
+          </a:p>
+        </p:txBody>
+      </p:sp>
+      <p:sp>
+        <p:nvSpPr>
+          <p:cNvPr id="5" name="Rectangle 4"/>
+          <p:cNvSpPr/>
+          <p:nvPr/>
+        </p:nvSpPr>
+        <p:spPr>
+          <a:xfrm>
+            <a:off x="-4445" y="6741160"/>
+            <a:ext cx="12186920" cy="102235"/>
+          </a:xfrm>
+          <a:prstGeom prst="rect">
+            <a:avLst/>
+          </a:prstGeom>
+        </p:spPr>
+        <p:style>
+          <a:lnRef idx="1">
+            <a:schemeClr val="accent1"/>
+          </a:lnRef>
+          <a:fillRef idx="2">
+            <a:schemeClr val="accent1"/>
+          </a:fillRef>
+          <a:effectRef idx="1">
+            <a:schemeClr val="accent1"/>
+          </a:effectRef>
+          <a:fontRef idx="minor">
+            <a:schemeClr val="dk1"/>
+          </a:fontRef>
+        </p:style>
+        <p:txBody>
+          <a:bodyPr rtlCol="0" anchor="ctr"/>
+          <a:p>
+            <a:pPr algn="ctr"/>
+            <a:endParaRPr lang="en-IN" altLang="en-US"/>
+          </a:p>
+        </p:txBody>
+      </p:sp>
+      <p:pic>
+        <p:nvPicPr>
+          <p:cNvPr id="6" name="Picture 5" descr="images"/>
+          <p:cNvPicPr>
+            <a:picLocks noChangeAspect="1"/>
+          </p:cNvPicPr>
+          <p:nvPr/>
+        </p:nvPicPr>
+        <p:blipFill>
+          <a:blip r:embed="rId1"/>
+          <a:stretch>
+            <a:fillRect/>
+          </a:stretch>
+        </p:blipFill>
+        <p:spPr>
+          <a:xfrm>
+            <a:off x="11468100" y="106680"/>
+            <a:ext cx="715645" cy="626110"/>
+          </a:xfrm>
+          <a:prstGeom prst="rect">
+            <a:avLst/>
+          </a:prstGeom>
+        </p:spPr>
+      </p:pic>
+      <p:sp>
+        <p:nvSpPr>
+          <p:cNvPr id="3" name="TextBox 2"/>
+          <p:cNvSpPr txBox="1"/>
+          <p:nvPr/>
+        </p:nvSpPr>
+        <p:spPr>
+          <a:xfrm>
+            <a:off x="114300" y="223520"/>
+            <a:ext cx="11232515" cy="383540"/>
+          </a:xfrm>
+          <a:prstGeom prst="rect">
+            <a:avLst/>
+          </a:prstGeom>
+          <a:noFill/>
+        </p:spPr>
+        <p:txBody>
+          <a:bodyPr wrap="square" rtlCol="0">
+            <a:spAutoFit/>
+          </a:bodyPr>
+          <a:p>
+            <a:r>
+              <a:rPr lang="x-none" altLang="en-IN">
+                <a:solidFill>
+                  <a:schemeClr val="tx1"/>
+                </a:solidFill>
+              </a:rPr>
+              <a:t>Translation Lookaside Buffer operation</a:t>
+            </a:r>
+            <a:endParaRPr lang="x-none" altLang="en-IN">
+              <a:solidFill>
+                <a:schemeClr val="tx1"/>
+              </a:solidFill>
+            </a:endParaRPr>
+          </a:p>
+        </p:txBody>
+      </p:sp>
+      <p:sp>
+        <p:nvSpPr>
+          <p:cNvPr id="2" name="TextBox 1"/>
+          <p:cNvSpPr txBox="1"/>
+          <p:nvPr/>
+        </p:nvSpPr>
+        <p:spPr>
+          <a:xfrm>
+            <a:off x="262255" y="648335"/>
+            <a:ext cx="4683760" cy="2578100"/>
+          </a:xfrm>
+          <a:prstGeom prst="rect">
+            <a:avLst/>
+          </a:prstGeom>
+          <a:noFill/>
+        </p:spPr>
+        <p:txBody>
+          <a:bodyPr wrap="square" rtlCol="0">
+            <a:spAutoFit/>
+          </a:bodyPr>
+          <a:p>
+            <a:pPr marL="285750" lvl="0" indent="-285750" algn="just">
+              <a:buFont typeface="Arial" charset="0"/>
+              <a:buChar char="•"/>
+            </a:pPr>
+            <a:r>
+              <a:rPr lang="x-none" altLang="en-IN"/>
+              <a:t>If TLB hit, then translate directly and use</a:t>
+            </a:r>
+            <a:endParaRPr lang="x-none" altLang="en-IN"/>
+          </a:p>
+          <a:p>
+            <a:pPr marL="285750" lvl="0" indent="-285750" algn="just">
+              <a:buFont typeface="Arial" charset="0"/>
+              <a:buChar char="•"/>
+            </a:pPr>
+            <a:r>
+              <a:rPr lang="x-none" altLang="en-IN">
+                <a:solidFill>
+                  <a:schemeClr val="tx1"/>
+                </a:solidFill>
+              </a:rPr>
+              <a:t>If TLB miss</a:t>
+            </a:r>
+            <a:endParaRPr lang="x-none" altLang="en-IN">
+              <a:solidFill>
+                <a:schemeClr val="tx1"/>
+              </a:solidFill>
+            </a:endParaRPr>
+          </a:p>
+          <a:p>
+            <a:pPr marL="742950" lvl="1" indent="-285750" algn="just">
+              <a:buFont typeface="Arial" charset="0"/>
+              <a:buChar char="•"/>
+            </a:pPr>
+            <a:r>
+              <a:rPr lang="x-none" altLang="en-IN">
+                <a:solidFill>
+                  <a:schemeClr val="tx1"/>
+                </a:solidFill>
+              </a:rPr>
+              <a:t>Not in TLB but in page table</a:t>
+            </a:r>
+            <a:endParaRPr lang="x-none" altLang="en-IN">
+              <a:solidFill>
+                <a:schemeClr val="tx1"/>
+              </a:solidFill>
+            </a:endParaRPr>
+          </a:p>
+          <a:p>
+            <a:pPr marL="1200150" lvl="2" indent="-285750" algn="just">
+              <a:buFont typeface="Arial" charset="0"/>
+              <a:buChar char="•"/>
+            </a:pPr>
+            <a:r>
+              <a:rPr lang="x-none" altLang="en-IN">
+                <a:solidFill>
+                  <a:schemeClr val="tx1"/>
+                </a:solidFill>
+              </a:rPr>
+              <a:t>Load from page table to TLB (just like a cache miss)</a:t>
+            </a:r>
+            <a:endParaRPr lang="x-none" altLang="en-IN">
+              <a:solidFill>
+                <a:schemeClr val="tx1"/>
+              </a:solidFill>
+            </a:endParaRPr>
+          </a:p>
+          <a:p>
+            <a:pPr marL="742950" lvl="1" indent="-285750" algn="just">
+              <a:buFont typeface="Arial" charset="0"/>
+              <a:buChar char="•"/>
+            </a:pPr>
+            <a:r>
+              <a:rPr lang="x-none" altLang="en-IN">
+                <a:solidFill>
+                  <a:schemeClr val="tx1"/>
+                </a:solidFill>
+              </a:rPr>
+              <a:t>Page fault</a:t>
+            </a:r>
+            <a:endParaRPr lang="x-none" altLang="en-IN">
+              <a:solidFill>
+                <a:schemeClr val="tx1"/>
+              </a:solidFill>
+            </a:endParaRPr>
+          </a:p>
+          <a:p>
+            <a:pPr marL="1200150" lvl="2" indent="-285750" algn="just">
+              <a:buFont typeface="Arial" charset="0"/>
+              <a:buChar char="•"/>
+            </a:pPr>
+            <a:r>
+              <a:rPr lang="x-none" altLang="en-IN">
+                <a:solidFill>
+                  <a:schemeClr val="tx1"/>
+                </a:solidFill>
+              </a:rPr>
+              <a:t>The page needs to the loaded into the memory, possibly swapped</a:t>
+            </a:r>
+            <a:endParaRPr lang="x-none" altLang="en-IN">
+              <a:solidFill>
+                <a:schemeClr val="tx1"/>
+              </a:solidFill>
+            </a:endParaRPr>
+          </a:p>
+        </p:txBody>
+      </p:sp>
+      <p:pic>
+        <p:nvPicPr>
+          <p:cNvPr id="148482" name="Picture 5" descr="f05-23-P374493"/>
+          <p:cNvPicPr>
+            <a:picLocks noChangeAspect="1"/>
+          </p:cNvPicPr>
+          <p:nvPr/>
+        </p:nvPicPr>
+        <p:blipFill>
+          <a:blip r:embed="rId2"/>
+          <a:stretch>
+            <a:fillRect/>
+          </a:stretch>
+        </p:blipFill>
+        <p:spPr>
+          <a:xfrm>
+            <a:off x="5014595" y="1152843"/>
+            <a:ext cx="6535738" cy="4606925"/>
+          </a:xfrm>
+          <a:prstGeom prst="rect">
+            <a:avLst/>
+          </a:prstGeom>
+          <a:noFill/>
+          <a:ln w="9525">
+            <a:noFill/>
+            <a:miter/>
+          </a:ln>
+        </p:spPr>
+      </p:pic>
+    </p:spTree>
+  </p:cSld>
+  <p:clrMapOvr>
+    <a:masterClrMapping/>
+  </p:clrMapOvr>
+  <p:timing>
+    <p:tnLst>
+      <p:par>
+        <p:cTn id="1" dur="indefinite" restart="never" nodeType="tmRoot"/>
+      </p:par>
+    </p:tnLst>
+  </p:timing>
+</p:sld>
+</file>
+
+<file path=ppt/slides/slide13.xml><?xml version="1.0" encoding="utf-8"?>
+<p:sld xmlns:a="http://schemas.openxmlformats.org/drawingml/2006/main" xmlns:r="http://schemas.openxmlformats.org/officeDocument/2006/relationships" xmlns:p="http://schemas.openxmlformats.org/presentationml/2006/main">
+  <p:cSld>
+    <p:spTree>
+      <p:nvGrpSpPr>
+        <p:cNvPr id="1" name=""/>
+        <p:cNvGrpSpPr/>
+        <p:nvPr/>
+      </p:nvGrpSpPr>
+      <p:grpSpPr/>
+      <p:sp>
+        <p:nvSpPr>
+          <p:cNvPr id="4" name="Rectangle 3"/>
+          <p:cNvSpPr/>
+          <p:nvPr/>
+        </p:nvSpPr>
+        <p:spPr>
+          <a:xfrm>
+            <a:off x="-3175" y="-11430"/>
+            <a:ext cx="12186920" cy="102235"/>
+          </a:xfrm>
+          <a:prstGeom prst="rect">
+            <a:avLst/>
+          </a:prstGeom>
+        </p:spPr>
+        <p:style>
+          <a:lnRef idx="1">
+            <a:schemeClr val="accent1"/>
+          </a:lnRef>
+          <a:fillRef idx="2">
+            <a:schemeClr val="accent1"/>
+          </a:fillRef>
+          <a:effectRef idx="1">
+            <a:schemeClr val="accent1"/>
+          </a:effectRef>
+          <a:fontRef idx="minor">
+            <a:schemeClr val="dk1"/>
+          </a:fontRef>
+        </p:style>
+        <p:txBody>
+          <a:bodyPr rtlCol="0" anchor="ctr"/>
+          <a:p>
+            <a:pPr algn="ctr"/>
+            <a:endParaRPr lang="en-IN" altLang="en-US"/>
+          </a:p>
+        </p:txBody>
+      </p:sp>
+      <p:sp>
+        <p:nvSpPr>
+          <p:cNvPr id="5" name="Rectangle 4"/>
+          <p:cNvSpPr/>
+          <p:nvPr/>
+        </p:nvSpPr>
+        <p:spPr>
+          <a:xfrm>
+            <a:off x="-4445" y="6741160"/>
+            <a:ext cx="12186920" cy="102235"/>
+          </a:xfrm>
+          <a:prstGeom prst="rect">
+            <a:avLst/>
+          </a:prstGeom>
+        </p:spPr>
+        <p:style>
+          <a:lnRef idx="1">
+            <a:schemeClr val="accent1"/>
+          </a:lnRef>
+          <a:fillRef idx="2">
+            <a:schemeClr val="accent1"/>
+          </a:fillRef>
+          <a:effectRef idx="1">
+            <a:schemeClr val="accent1"/>
+          </a:effectRef>
+          <a:fontRef idx="minor">
+            <a:schemeClr val="dk1"/>
+          </a:fontRef>
+        </p:style>
+        <p:txBody>
+          <a:bodyPr rtlCol="0" anchor="ctr"/>
+          <a:p>
+            <a:pPr algn="ctr"/>
+            <a:endParaRPr lang="en-IN" altLang="en-US"/>
+          </a:p>
+        </p:txBody>
+      </p:sp>
+      <p:pic>
+        <p:nvPicPr>
+          <p:cNvPr id="6" name="Picture 5" descr="images"/>
+          <p:cNvPicPr>
+            <a:picLocks noChangeAspect="1"/>
+          </p:cNvPicPr>
+          <p:nvPr/>
+        </p:nvPicPr>
+        <p:blipFill>
+          <a:blip r:embed="rId1"/>
+          <a:stretch>
+            <a:fillRect/>
+          </a:stretch>
+        </p:blipFill>
+        <p:spPr>
+          <a:xfrm>
+            <a:off x="11468100" y="106680"/>
+            <a:ext cx="715645" cy="626110"/>
+          </a:xfrm>
+          <a:prstGeom prst="rect">
+            <a:avLst/>
+          </a:prstGeom>
+        </p:spPr>
+      </p:pic>
+      <p:sp>
+        <p:nvSpPr>
+          <p:cNvPr id="3" name="TextBox 2"/>
+          <p:cNvSpPr txBox="1"/>
+          <p:nvPr/>
+        </p:nvSpPr>
+        <p:spPr>
+          <a:xfrm>
+            <a:off x="114300" y="223520"/>
+            <a:ext cx="11232515" cy="383540"/>
+          </a:xfrm>
+          <a:prstGeom prst="rect">
+            <a:avLst/>
+          </a:prstGeom>
+          <a:noFill/>
+        </p:spPr>
+        <p:txBody>
+          <a:bodyPr wrap="square" rtlCol="0">
+            <a:spAutoFit/>
+          </a:bodyPr>
+          <a:p>
+            <a:r>
+              <a:rPr lang="x-none" altLang="en-IN">
+                <a:solidFill>
+                  <a:schemeClr val="tx1"/>
+                </a:solidFill>
+              </a:rPr>
+              <a:t>Translation Lookaside Buffer along with Caches</a:t>
+            </a:r>
+            <a:endParaRPr lang="x-none" altLang="en-IN">
+              <a:solidFill>
+                <a:schemeClr val="tx1"/>
+              </a:solidFill>
+            </a:endParaRPr>
+          </a:p>
+        </p:txBody>
+      </p:sp>
+      <p:sp>
+        <p:nvSpPr>
+          <p:cNvPr id="2" name="TextBox 1"/>
+          <p:cNvSpPr txBox="1"/>
+          <p:nvPr/>
+        </p:nvSpPr>
+        <p:spPr>
+          <a:xfrm>
+            <a:off x="262255" y="648970"/>
+            <a:ext cx="5726430" cy="2029460"/>
+          </a:xfrm>
+          <a:prstGeom prst="rect">
+            <a:avLst/>
+          </a:prstGeom>
+          <a:noFill/>
+        </p:spPr>
+        <p:txBody>
+          <a:bodyPr wrap="square" rtlCol="0">
+            <a:spAutoFit/>
+          </a:bodyPr>
+          <a:p>
+            <a:pPr marL="285750" lvl="0" indent="-285750" algn="just">
+              <a:buFont typeface="Arial" charset="0"/>
+              <a:buChar char="•"/>
+            </a:pPr>
+            <a:r>
+              <a:rPr lang="x-none" altLang="en-IN">
+                <a:solidFill>
+                  <a:schemeClr val="tx1"/>
+                </a:solidFill>
+              </a:rPr>
+              <a:t>Virtual memory and caches work together as a hierarchy</a:t>
+            </a:r>
+            <a:endParaRPr lang="x-none" altLang="en-IN">
+              <a:solidFill>
+                <a:schemeClr val="tx1"/>
+              </a:solidFill>
+            </a:endParaRPr>
+          </a:p>
+          <a:p>
+            <a:pPr marL="285750" lvl="0" indent="-285750" algn="just">
+              <a:buFont typeface="Arial" charset="0"/>
+              <a:buChar char="•"/>
+            </a:pPr>
+            <a:r>
+              <a:rPr lang="x-none" altLang="en-IN">
+                <a:solidFill>
+                  <a:schemeClr val="tx1"/>
+                </a:solidFill>
+              </a:rPr>
+              <a:t>If the cache tag uses physical address then we need a scheme that does virtual to physical translation</a:t>
+            </a:r>
+            <a:endParaRPr lang="x-none" altLang="en-IN">
+              <a:solidFill>
+                <a:schemeClr val="tx1"/>
+              </a:solidFill>
+            </a:endParaRPr>
+          </a:p>
+          <a:p>
+            <a:pPr marL="285750" lvl="0" indent="-285750" algn="just">
+              <a:buFont typeface="Arial" charset="0"/>
+              <a:buChar char="•"/>
+            </a:pPr>
+            <a:r>
+              <a:rPr lang="x-none" altLang="en-IN">
+                <a:solidFill>
+                  <a:schemeClr val="tx1"/>
+                </a:solidFill>
+              </a:rPr>
+              <a:t>Several possibilities arise in the hierarchy as shown below</a:t>
+            </a:r>
+            <a:endParaRPr lang="x-none" altLang="en-IN">
+              <a:solidFill>
+                <a:schemeClr val="tx1"/>
+              </a:solidFill>
+            </a:endParaRPr>
+          </a:p>
+        </p:txBody>
+      </p:sp>
+      <p:pic>
+        <p:nvPicPr>
+          <p:cNvPr id="156676" name="Picture 5" descr="f05-24-P374493"/>
+          <p:cNvPicPr>
+            <a:picLocks noChangeAspect="1"/>
+          </p:cNvPicPr>
+          <p:nvPr/>
+        </p:nvPicPr>
+        <p:blipFill>
+          <a:blip r:embed="rId2"/>
+          <a:stretch>
+            <a:fillRect/>
+          </a:stretch>
+        </p:blipFill>
+        <p:spPr>
+          <a:xfrm>
+            <a:off x="6384290" y="664210"/>
+            <a:ext cx="5560695" cy="5704840"/>
+          </a:xfrm>
+          <a:prstGeom prst="rect">
+            <a:avLst/>
+          </a:prstGeom>
+          <a:noFill/>
+          <a:ln w="9525">
+            <a:noFill/>
+            <a:miter/>
+          </a:ln>
+        </p:spPr>
+      </p:pic>
+      <p:pic>
+        <p:nvPicPr>
+          <p:cNvPr id="34821" name="Picture 6" descr="f05-32-9780124077263"/>
+          <p:cNvPicPr>
+            <a:picLocks noChangeAspect="1"/>
+          </p:cNvPicPr>
+          <p:nvPr>
+            <p:ph idx="1"/>
+          </p:nvPr>
+        </p:nvPicPr>
+        <p:blipFill>
+          <a:blip r:embed="rId3"/>
+          <a:srcRect/>
+          <a:stretch>
+            <a:fillRect/>
+          </a:stretch>
+        </p:blipFill>
+        <p:spPr>
+          <a:xfrm>
+            <a:off x="281305" y="3021330"/>
+            <a:ext cx="6047740" cy="1871345"/>
+          </a:xfrm>
+          <a:ln w="9525">
+            <a:noFill/>
+            <a:miter/>
+          </a:ln>
+        </p:spPr>
+      </p:pic>
+    </p:spTree>
+  </p:cSld>
+  <p:clrMapOvr>
+    <a:masterClrMapping/>
+  </p:clrMapOvr>
+  <p:timing>
+    <p:tnLst>
+      <p:par>
+        <p:cTn id="1" dur="indefinite" restart="never" nodeType="tmRoot"/>
+      </p:par>
+    </p:tnLst>
+  </p:timing>
+</p:sld>
+</file>
+
+<file path=ppt/slides/slide14.xml><?xml version="1.0" encoding="utf-8"?>
+<p:sld xmlns:a="http://schemas.openxmlformats.org/drawingml/2006/main" xmlns:r="http://schemas.openxmlformats.org/officeDocument/2006/relationships" xmlns:p="http://schemas.openxmlformats.org/presentationml/2006/main">
+  <p:cSld>
+    <p:spTree>
+      <p:nvGrpSpPr>
+        <p:cNvPr id="1" name=""/>
+        <p:cNvGrpSpPr/>
+        <p:nvPr/>
+      </p:nvGrpSpPr>
+      <p:grpSpPr/>
+      <p:sp>
+        <p:nvSpPr>
+          <p:cNvPr id="4" name="Rectangle 3"/>
+          <p:cNvSpPr/>
+          <p:nvPr/>
+        </p:nvSpPr>
+        <p:spPr>
+          <a:xfrm>
+            <a:off x="-3175" y="-11430"/>
+            <a:ext cx="12186920" cy="102235"/>
+          </a:xfrm>
+          <a:prstGeom prst="rect">
+            <a:avLst/>
+          </a:prstGeom>
+        </p:spPr>
+        <p:style>
+          <a:lnRef idx="1">
+            <a:schemeClr val="accent1"/>
+          </a:lnRef>
+          <a:fillRef idx="2">
+            <a:schemeClr val="accent1"/>
+          </a:fillRef>
+          <a:effectRef idx="1">
+            <a:schemeClr val="accent1"/>
+          </a:effectRef>
+          <a:fontRef idx="minor">
+            <a:schemeClr val="dk1"/>
+          </a:fontRef>
+        </p:style>
+        <p:txBody>
+          <a:bodyPr rtlCol="0" anchor="ctr"/>
+          <a:p>
+            <a:pPr algn="ctr"/>
+            <a:endParaRPr lang="en-IN" altLang="en-US"/>
+          </a:p>
+        </p:txBody>
+      </p:sp>
+      <p:sp>
+        <p:nvSpPr>
+          <p:cNvPr id="5" name="Rectangle 4"/>
+          <p:cNvSpPr/>
+          <p:nvPr/>
+        </p:nvSpPr>
+        <p:spPr>
+          <a:xfrm>
+            <a:off x="-4445" y="6741160"/>
+            <a:ext cx="12186920" cy="102235"/>
+          </a:xfrm>
+          <a:prstGeom prst="rect">
+            <a:avLst/>
+          </a:prstGeom>
+        </p:spPr>
+        <p:style>
+          <a:lnRef idx="1">
+            <a:schemeClr val="accent1"/>
+          </a:lnRef>
+          <a:fillRef idx="2">
+            <a:schemeClr val="accent1"/>
+          </a:fillRef>
+          <a:effectRef idx="1">
+            <a:schemeClr val="accent1"/>
+          </a:effectRef>
+          <a:fontRef idx="minor">
+            <a:schemeClr val="dk1"/>
+          </a:fontRef>
+        </p:style>
+        <p:txBody>
+          <a:bodyPr rtlCol="0" anchor="ctr"/>
+          <a:p>
+            <a:pPr algn="ctr"/>
+            <a:endParaRPr lang="en-IN" altLang="en-US"/>
+          </a:p>
+        </p:txBody>
+      </p:sp>
+      <p:pic>
+        <p:nvPicPr>
+          <p:cNvPr id="6" name="Picture 5" descr="images"/>
+          <p:cNvPicPr>
+            <a:picLocks noChangeAspect="1"/>
+          </p:cNvPicPr>
+          <p:nvPr/>
+        </p:nvPicPr>
+        <p:blipFill>
+          <a:blip r:embed="rId1"/>
+          <a:stretch>
+            <a:fillRect/>
+          </a:stretch>
+        </p:blipFill>
+        <p:spPr>
+          <a:xfrm>
+            <a:off x="11468100" y="106680"/>
+            <a:ext cx="715645" cy="626110"/>
+          </a:xfrm>
+          <a:prstGeom prst="rect">
+            <a:avLst/>
+          </a:prstGeom>
+        </p:spPr>
+      </p:pic>
+      <p:sp>
+        <p:nvSpPr>
+          <p:cNvPr id="3" name="TextBox 2"/>
+          <p:cNvSpPr txBox="1"/>
+          <p:nvPr/>
+        </p:nvSpPr>
+        <p:spPr>
+          <a:xfrm>
+            <a:off x="114300" y="223520"/>
+            <a:ext cx="11232515" cy="383540"/>
+          </a:xfrm>
+          <a:prstGeom prst="rect">
+            <a:avLst/>
+          </a:prstGeom>
+          <a:noFill/>
+        </p:spPr>
+        <p:txBody>
+          <a:bodyPr wrap="square" rtlCol="0">
+            <a:spAutoFit/>
+          </a:bodyPr>
+          <a:p>
+            <a:r>
+              <a:rPr lang="x-none" altLang="en-IN">
+                <a:solidFill>
+                  <a:schemeClr val="tx1"/>
+                </a:solidFill>
+              </a:rPr>
+              <a:t>Memory protection</a:t>
+            </a:r>
+            <a:endParaRPr lang="x-none" altLang="en-IN">
+              <a:solidFill>
+                <a:schemeClr val="tx1"/>
+              </a:solidFill>
+            </a:endParaRPr>
+          </a:p>
+        </p:txBody>
+      </p:sp>
+      <p:sp>
+        <p:nvSpPr>
+          <p:cNvPr id="2" name="TextBox 1"/>
+          <p:cNvSpPr txBox="1"/>
+          <p:nvPr/>
+        </p:nvSpPr>
+        <p:spPr>
+          <a:xfrm>
+            <a:off x="262255" y="649605"/>
+            <a:ext cx="11541760" cy="2303780"/>
+          </a:xfrm>
+          <a:prstGeom prst="rect">
+            <a:avLst/>
+          </a:prstGeom>
+          <a:noFill/>
+        </p:spPr>
+        <p:txBody>
+          <a:bodyPr wrap="square" rtlCol="0">
+            <a:spAutoFit/>
+          </a:bodyPr>
+          <a:p>
+            <a:pPr marL="285750" lvl="0" indent="-285750" algn="just">
+              <a:buFont typeface="Arial" charset="0"/>
+              <a:buChar char="•"/>
+            </a:pPr>
+            <a:r>
+              <a:rPr lang="x-none" altLang="en-IN">
+                <a:solidFill>
+                  <a:schemeClr val="tx1"/>
+                </a:solidFill>
+              </a:rPr>
+              <a:t>TLB usually contains a write access bit - indicating whether the page can be written to</a:t>
+            </a:r>
+            <a:endParaRPr lang="x-none" altLang="en-IN">
+              <a:solidFill>
+                <a:schemeClr val="tx1"/>
+              </a:solidFill>
+            </a:endParaRPr>
+          </a:p>
+          <a:p>
+            <a:pPr marL="285750" lvl="0" indent="-285750" algn="just">
+              <a:buFont typeface="Arial" charset="0"/>
+              <a:buChar char="•"/>
+            </a:pPr>
+            <a:r>
+              <a:rPr lang="x-none" altLang="en-IN">
+                <a:solidFill>
+                  <a:schemeClr val="tx1"/>
+                </a:solidFill>
+              </a:rPr>
+              <a:t>Protection is implemented by the operating system with support from the underlying hardware</a:t>
+            </a:r>
+            <a:endParaRPr lang="x-none" altLang="en-IN">
+              <a:solidFill>
+                <a:schemeClr val="tx1"/>
+              </a:solidFill>
+            </a:endParaRPr>
+          </a:p>
+          <a:p>
+            <a:pPr marL="742950" lvl="1" indent="-285750" algn="just">
+              <a:buFont typeface="Arial" charset="0"/>
+              <a:buChar char="•"/>
+            </a:pPr>
+            <a:r>
+              <a:rPr lang="x-none" altLang="en-IN">
+                <a:solidFill>
+                  <a:schemeClr val="tx1"/>
+                </a:solidFill>
+              </a:rPr>
+              <a:t>Two modes - kernel/supervisor and user</a:t>
+            </a:r>
+            <a:endParaRPr lang="x-none" altLang="en-IN">
+              <a:solidFill>
+                <a:schemeClr val="tx1"/>
+              </a:solidFill>
+            </a:endParaRPr>
+          </a:p>
+          <a:p>
+            <a:pPr marL="742950" lvl="1" indent="-285750" algn="just">
+              <a:buFont typeface="Arial" charset="0"/>
+              <a:buChar char="•"/>
+            </a:pPr>
+            <a:r>
+              <a:rPr lang="x-none" altLang="en-IN">
+                <a:solidFill>
+                  <a:schemeClr val="tx1"/>
+                </a:solidFill>
+              </a:rPr>
+              <a:t>In user mode, several important registers (page table register, page table) are only readable</a:t>
+            </a:r>
+            <a:endParaRPr lang="x-none" altLang="en-IN">
+              <a:solidFill>
+                <a:schemeClr val="tx1"/>
+              </a:solidFill>
+            </a:endParaRPr>
+          </a:p>
+          <a:p>
+            <a:pPr marL="742950" lvl="1" indent="-285750" algn="just">
+              <a:buFont typeface="Arial" charset="0"/>
+              <a:buChar char="•"/>
+            </a:pPr>
+            <a:r>
+              <a:rPr lang="x-none" altLang="en-IN">
+                <a:solidFill>
+                  <a:schemeClr val="tx1"/>
+                </a:solidFill>
+              </a:rPr>
+              <a:t>In kernel mode, the operating system can control these registers</a:t>
+            </a:r>
+            <a:endParaRPr lang="x-none" altLang="en-IN">
+              <a:solidFill>
+                <a:schemeClr val="tx1"/>
+              </a:solidFill>
+            </a:endParaRPr>
+          </a:p>
+          <a:p>
+            <a:pPr marL="1200150" lvl="2" indent="-285750" algn="just">
+              <a:buFont typeface="Arial" charset="0"/>
+              <a:buChar char="•"/>
+            </a:pPr>
+            <a:r>
+              <a:rPr lang="x-none" altLang="en-IN">
+                <a:solidFill>
+                  <a:schemeClr val="tx1"/>
+                </a:solidFill>
+              </a:rPr>
+              <a:t>System calls - from user mode to kernel mode (an exception)</a:t>
+            </a:r>
+            <a:endParaRPr lang="x-none" altLang="en-IN">
+              <a:solidFill>
+                <a:schemeClr val="tx1"/>
+              </a:solidFill>
+            </a:endParaRPr>
+          </a:p>
+          <a:p>
+            <a:pPr marL="1200150" lvl="2" indent="-285750" algn="just">
+              <a:buFont typeface="Arial" charset="0"/>
+              <a:buChar char="•"/>
+            </a:pPr>
+            <a:r>
+              <a:rPr lang="x-none" altLang="en-IN">
+                <a:solidFill>
+                  <a:schemeClr val="tx1"/>
+                </a:solidFill>
+              </a:rPr>
+              <a:t>ERET - return from exception, from kernel mode to user mode</a:t>
+            </a:r>
+            <a:endParaRPr lang="x-none" altLang="en-IN">
+              <a:solidFill>
+                <a:schemeClr val="tx1"/>
+              </a:solidFill>
+            </a:endParaRPr>
+          </a:p>
+          <a:p>
+            <a:pPr marL="285750" lvl="0" indent="-285750" algn="just">
+              <a:buFont typeface="Arial" charset="0"/>
+              <a:buChar char="•"/>
+            </a:pPr>
+            <a:r>
+              <a:rPr lang="x-none" altLang="en-IN">
+                <a:solidFill>
+                  <a:schemeClr val="tx1"/>
+                </a:solidFill>
+              </a:rPr>
+              <a:t>How to make sure that processes don't read other program's data?</a:t>
+            </a:r>
+            <a:endParaRPr lang="x-none" altLang="en-IN">
+              <a:solidFill>
+                <a:schemeClr val="tx1"/>
+              </a:solidFill>
+            </a:endParaRPr>
+          </a:p>
+        </p:txBody>
+      </p:sp>
+    </p:spTree>
+  </p:cSld>
+  <p:clrMapOvr>
+    <a:masterClrMapping/>
+  </p:clrMapOvr>
+  <p:timing>
+    <p:tnLst>
+      <p:par>
+        <p:cTn id="1" dur="indefinite" restart="never" nodeType="tmRoot"/>
+      </p:par>
+    </p:tnLst>
+  </p:timing>
+</p:sld>
+</file>
+
 <file path=ppt/slides/slide2.xml><?xml version="1.0" encoding="utf-8"?>
 <p:sld xmlns:a="http://schemas.openxmlformats.org/drawingml/2006/main" xmlns:r="http://schemas.openxmlformats.org/officeDocument/2006/relationships" xmlns:p="http://schemas.openxmlformats.org/presentationml/2006/main">
   <p:cSld>
@@ -4699,7 +6550,7 @@
         <p:spPr>
           <a:xfrm>
             <a:off x="558165" y="686435"/>
-            <a:ext cx="10859770" cy="2578100"/>
+            <a:ext cx="10859770" cy="2852420"/>
           </a:xfrm>
           <a:prstGeom prst="rect">
             <a:avLst/>
@@ -4829,6 +6680,17 @@
             <a:r>
               <a:rPr lang="x-none" altLang="en-IN"/>
               <a:t>Block sizes for caches</a:t>
+            </a:r>
+            <a:endParaRPr lang="x-none" altLang="en-IN"/>
+          </a:p>
+          <a:p>
+            <a:pPr marL="742950" lvl="1" indent="-285750">
+              <a:buFont typeface="Arial" charset="0"/>
+              <a:buChar char="•"/>
+            </a:pPr>
+            <a:r>
+              <a:rPr lang="x-none" altLang="en-IN"/>
+              <a:t>Measurement of cache performance</a:t>
             </a:r>
             <a:endParaRPr lang="x-none" altLang="en-IN"/>
           </a:p>
@@ -5014,7 +6876,7 @@
         <p:spPr>
           <a:xfrm>
             <a:off x="262255" y="725170"/>
-            <a:ext cx="10859770" cy="3401060"/>
+            <a:ext cx="10859770" cy="3675380"/>
           </a:xfrm>
           <a:prstGeom prst="rect">
             <a:avLst/>
@@ -5034,7 +6896,7 @@
               <a:rPr lang="x-none" altLang="en-IN">
                 <a:sym typeface="+mn-ea"/>
               </a:rPr>
-              <a:t>The main memory or RAM is used as a cache for the hard disk</a:t>
+              <a:t>The main memory or (D)RAM is used as a cache for the hard disk</a:t>
             </a:r>
             <a:endParaRPr lang="x-none" altLang="en-IN">
               <a:sym typeface="+mn-ea"/>
@@ -5058,7 +6920,7 @@
             </a:pPr>
             <a:r>
               <a:rPr lang="x-none" altLang="en-IN"/>
-              <a:t>Each program actually gets its own virtual memory space which is protected from other programs - other programs cannot read or write into this space.</a:t>
+              <a:t>Each program actually gets its own virtual memory space which is protected from other programs - other programs cannot read or write into this space. Very important for a processor to run multiple programs at once</a:t>
             </a:r>
             <a:endParaRPr lang="x-none" altLang="en-IN"/>
           </a:p>
@@ -5979,8 +7841,8 @@
         </p:nvSpPr>
         <p:spPr>
           <a:xfrm>
-            <a:off x="365125" y="1046480"/>
-            <a:ext cx="5416550" cy="4772660"/>
+            <a:off x="365125" y="843280"/>
+            <a:ext cx="5416550" cy="5595620"/>
           </a:xfrm>
           <a:prstGeom prst="rect">
             <a:avLst/>
@@ -6105,6 +7967,24 @@
             <a:r>
               <a:rPr lang="x-none" altLang="en-IN"/>
               <a:t>Use better replacement algorithms than LRU</a:t>
+            </a:r>
+            <a:endParaRPr lang="x-none" altLang="en-IN"/>
+          </a:p>
+          <a:p>
+            <a:pPr marL="285750" lvl="0" indent="-285750" algn="just">
+              <a:buFont typeface="Arial" charset="0"/>
+              <a:buChar char="•"/>
+            </a:pPr>
+            <a:endParaRPr lang="x-none" altLang="en-IN"/>
+          </a:p>
+          <a:p>
+            <a:pPr marL="285750" lvl="0" indent="-285750" algn="just">
+              <a:buFont typeface="Arial" charset="0"/>
+              <a:buChar char="•"/>
+            </a:pPr>
+            <a:r>
+              <a:rPr lang="x-none" altLang="en-IN"/>
+              <a:t>Usually virtual address space is much larger compared to the actual memory available</a:t>
             </a:r>
             <a:endParaRPr lang="x-none" altLang="en-IN"/>
           </a:p>
@@ -6279,7 +8159,7 @@
         <p:spPr>
           <a:xfrm>
             <a:off x="262255" y="647700"/>
-            <a:ext cx="5416550" cy="5321300"/>
+            <a:ext cx="5416550" cy="5869940"/>
           </a:xfrm>
           <a:prstGeom prst="rect">
             <a:avLst/>
@@ -6419,6 +8299,17 @@
             <a:r>
               <a:rPr lang="x-none" altLang="en-IN"/>
               <a:t>OS needs to change the page table register when different programs are run</a:t>
+            </a:r>
+            <a:endParaRPr lang="x-none" altLang="en-IN"/>
+          </a:p>
+          <a:p>
+            <a:pPr marL="742950" lvl="1" indent="-285750" algn="just">
+              <a:buFont typeface="Arial" charset="0"/>
+              <a:buChar char="•"/>
+            </a:pPr>
+            <a:r>
+              <a:rPr lang="x-none" altLang="en-IN"/>
+              <a:t>Process: Programs along with such state variables</a:t>
             </a:r>
             <a:endParaRPr lang="x-none" altLang="en-IN"/>
           </a:p>
@@ -6909,7 +8800,7 @@
                   <a:schemeClr val="tx1"/>
                 </a:solidFill>
               </a:rPr>
-              <a:t>Virtual memory - dirty pages</a:t>
+              <a:t>Size of page tables - example</a:t>
             </a:r>
             <a:endParaRPr lang="x-none" altLang="en-IN">
               <a:solidFill>
@@ -6927,8 +8818,8 @@
         </p:nvSpPr>
         <p:spPr>
           <a:xfrm>
-            <a:off x="262255" y="647700"/>
-            <a:ext cx="11579860" cy="2029460"/>
+            <a:off x="262890" y="647700"/>
+            <a:ext cx="11669395" cy="2852420"/>
           </a:xfrm>
           <a:prstGeom prst="rect">
             <a:avLst/>
@@ -6946,7 +8837,7 @@
             </a:pPr>
             <a:r>
               <a:rPr lang="x-none" altLang="en-IN"/>
-              <a:t>Suppose there is a page in main memory and one of the words in that page was written to</a:t>
+              <a:t>32 bit virtual address</a:t>
             </a:r>
             <a:endParaRPr lang="x-none" altLang="en-IN"/>
           </a:p>
@@ -6957,7 +8848,7 @@
             </a:pPr>
             <a:r>
               <a:rPr lang="x-none" altLang="en-IN"/>
-              <a:t>Write through is not efficient, as we don't want to write to the disk everytime to maintain consistency (disk access is of the order of millions of processor cycle times)</a:t>
+              <a:t>4 KB pages</a:t>
             </a:r>
             <a:endParaRPr lang="x-none" altLang="en-IN"/>
           </a:p>
@@ -6968,7 +8859,7 @@
             </a:pPr>
             <a:r>
               <a:rPr lang="x-none" altLang="en-IN"/>
-              <a:t>Write back is used</a:t>
+              <a:t>4 bytes per page table entry</a:t>
             </a:r>
             <a:endParaRPr lang="x-none" altLang="en-IN"/>
           </a:p>
@@ -6977,31 +8868,75 @@
               <a:buFont typeface="Arial" charset="0"/>
               <a:buChar char="•"/>
             </a:pPr>
+            <a:endParaRPr lang="x-none" altLang="en-IN"/>
+          </a:p>
+          <a:p>
+            <a:pPr marL="285750" lvl="0" indent="-285750" algn="just">
+              <a:buFont typeface="Arial" charset="0"/>
+              <a:buChar char="•"/>
+            </a:pPr>
             <a:r>
               <a:rPr lang="x-none" altLang="en-IN"/>
-              <a:t>The page table also consists of a dirty bit.</a:t>
+              <a:t>4 KB = 12 bits</a:t>
             </a:r>
             <a:endParaRPr lang="x-none" altLang="en-IN"/>
           </a:p>
           <a:p>
+            <a:pPr marL="285750" lvl="0" indent="-285750" algn="just">
+              <a:buFont typeface="Arial" charset="0"/>
+              <a:buChar char="•"/>
+            </a:pPr>
+            <a:r>
+              <a:rPr lang="x-none" altLang="en-IN"/>
+              <a:t>20 bits for page address</a:t>
+            </a:r>
+            <a:endParaRPr lang="x-none" altLang="en-IN"/>
+          </a:p>
+          <a:p>
+            <a:pPr marL="285750" lvl="0" indent="-285750" algn="just">
+              <a:buFont typeface="Arial" charset="0"/>
+              <a:buChar char="•"/>
+            </a:pPr>
+            <a:r>
+              <a:rPr lang="x-none" altLang="en-IN"/>
+              <a:t>Page table size = 2</a:t>
+            </a:r>
+            <a:r>
+              <a:rPr lang="x-none" altLang="en-IN" baseline="30000"/>
+              <a:t>22 </a:t>
+            </a:r>
+            <a:r>
+              <a:rPr lang="x-none" altLang="en-IN"/>
+              <a:t>= 4 MB</a:t>
+            </a:r>
+            <a:endParaRPr lang="x-none" altLang="en-IN"/>
+          </a:p>
+          <a:p>
+            <a:pPr marL="285750" lvl="0" indent="-285750" algn="just">
+              <a:buFont typeface="Arial" charset="0"/>
+              <a:buChar char="•"/>
+            </a:pPr>
+            <a:endParaRPr lang="x-none" altLang="en-IN"/>
+          </a:p>
+          <a:p>
+            <a:pPr marL="285750" lvl="0" indent="-285750" algn="just">
+              <a:buFont typeface="Arial" charset="0"/>
+              <a:buChar char="•"/>
+            </a:pPr>
+            <a:r>
+              <a:rPr lang="x-none" altLang="en-IN"/>
+              <a:t>What if there are multiple programs running?</a:t>
+            </a:r>
+            <a:endParaRPr lang="x-none" altLang="en-IN"/>
+          </a:p>
+          <a:p>
             <a:pPr marL="742950" lvl="1" indent="-285750" algn="just">
               <a:buFont typeface="Arial" charset="0"/>
               <a:buChar char="•"/>
             </a:pPr>
             <a:r>
               <a:rPr lang="x-none" altLang="en-IN"/>
-              <a:t>The bit is set whenever any word on a page is modified</a:t>
-            </a:r>
-            <a:endParaRPr lang="x-none" altLang="en-IN"/>
-          </a:p>
-          <a:p>
-            <a:pPr marL="742950" lvl="1" indent="-285750" algn="just">
-              <a:buFont typeface="Arial" charset="0"/>
-              <a:buChar char="•"/>
-            </a:pPr>
-            <a:r>
-              <a:rPr lang="x-none" altLang="en-IN"/>
-              <a:t>If the dirty bit is set for a page which has to be replaced, then it needs to be written back to the disk</a:t>
+              <a:t>Limit the size of page tables - allow page tables to grow if needed</a:t>
             </a:r>
             <a:endParaRPr lang="x-none" altLang="en-IN"/>
           </a:p>

</xml_diff>